<commit_message>
Added templates and more
</commit_message>
<xml_diff>
--- a/docs/interim_project_1.pptx
+++ b/docs/interim_project_1.pptx
@@ -16,14 +16,13 @@
     <p:sldId id="264" r:id="rId10"/>
     <p:sldId id="265" r:id="rId11"/>
     <p:sldId id="266" r:id="rId12"/>
-    <p:sldId id="267" r:id="rId13"/>
-    <p:sldId id="268" r:id="rId14"/>
-    <p:sldId id="269" r:id="rId15"/>
-    <p:sldId id="270" r:id="rId16"/>
-    <p:sldId id="271" r:id="rId17"/>
-    <p:sldId id="272" r:id="rId18"/>
-    <p:sldId id="274" r:id="rId19"/>
-    <p:sldId id="275" r:id="rId20"/>
+    <p:sldId id="268" r:id="rId13"/>
+    <p:sldId id="269" r:id="rId14"/>
+    <p:sldId id="270" r:id="rId15"/>
+    <p:sldId id="271" r:id="rId16"/>
+    <p:sldId id="272" r:id="rId17"/>
+    <p:sldId id="274" r:id="rId18"/>
+    <p:sldId id="275" r:id="rId19"/>
   </p:sldIdLst>
   <p:sldSz cx="12192000" cy="6858000"/>
   <p:notesSz cx="6858000" cy="9144000"/>
@@ -12450,89 +12449,6 @@
 <file path=ppt/slides/slide12.xml><?xml version="1.0" encoding="utf-8"?>
 <p:sld xmlns:a="http://schemas.openxmlformats.org/drawingml/2006/main" xmlns:r="http://schemas.openxmlformats.org/officeDocument/2006/relationships" xmlns:p="http://schemas.openxmlformats.org/presentationml/2006/main">
   <p:cSld>
-    <p:spTree>
-      <p:nvGrpSpPr>
-        <p:cNvPr id="1" name=""/>
-        <p:cNvGrpSpPr/>
-        <p:nvPr/>
-      </p:nvGrpSpPr>
-      <p:grpSpPr>
-        <a:xfrm>
-          <a:off x="0" y="0"/>
-          <a:ext cx="0" cy="0"/>
-          <a:chOff x="0" y="0"/>
-          <a:chExt cx="0" cy="0"/>
-        </a:xfrm>
-      </p:grpSpPr>
-      <p:sp>
-        <p:nvSpPr>
-          <p:cNvPr id="2" name="Title 1">
-            <a:extLst>
-              <a:ext uri="{FF2B5EF4-FFF2-40B4-BE49-F238E27FC236}">
-                <a16:creationId xmlns:a16="http://schemas.microsoft.com/office/drawing/2014/main" id="{310869FC-C9C0-8F04-E2C0-5D6A4E93D65A}"/>
-              </a:ext>
-            </a:extLst>
-          </p:cNvPr>
-          <p:cNvSpPr>
-            <a:spLocks noGrp="1"/>
-          </p:cNvSpPr>
-          <p:nvPr>
-            <p:ph type="title"/>
-          </p:nvPr>
-        </p:nvSpPr>
-        <p:spPr/>
-        <p:txBody>
-          <a:bodyPr/>
-          <a:lstStyle/>
-          <a:p>
-            <a:r>
-              <a:rPr lang="en-US" dirty="0"/>
-              <a:t>UI – Results Page</a:t>
-            </a:r>
-          </a:p>
-        </p:txBody>
-      </p:sp>
-      <p:sp>
-        <p:nvSpPr>
-          <p:cNvPr id="3" name="Content Placeholder 2">
-            <a:extLst>
-              <a:ext uri="{FF2B5EF4-FFF2-40B4-BE49-F238E27FC236}">
-                <a16:creationId xmlns:a16="http://schemas.microsoft.com/office/drawing/2014/main" id="{79F3D986-3036-514A-C7F7-69B2500BBD70}"/>
-              </a:ext>
-            </a:extLst>
-          </p:cNvPr>
-          <p:cNvSpPr>
-            <a:spLocks noGrp="1"/>
-          </p:cNvSpPr>
-          <p:nvPr>
-            <p:ph idx="1"/>
-          </p:nvPr>
-        </p:nvSpPr>
-        <p:spPr/>
-        <p:txBody>
-          <a:bodyPr/>
-          <a:lstStyle/>
-          <a:p>
-            <a:endParaRPr lang="en-US"/>
-          </a:p>
-        </p:txBody>
-      </p:sp>
-    </p:spTree>
-    <p:extLst>
-      <p:ext uri="{BB962C8B-B14F-4D97-AF65-F5344CB8AC3E}">
-        <p14:creationId xmlns:p14="http://schemas.microsoft.com/office/powerpoint/2010/main" val="1875550943"/>
-      </p:ext>
-    </p:extLst>
-  </p:cSld>
-  <p:clrMapOvr>
-    <a:masterClrMapping/>
-  </p:clrMapOvr>
-</p:sld>
-</file>
-
-<file path=ppt/slides/slide13.xml><?xml version="1.0" encoding="utf-8"?>
-<p:sld xmlns:a="http://schemas.openxmlformats.org/drawingml/2006/main" xmlns:r="http://schemas.openxmlformats.org/officeDocument/2006/relationships" xmlns:p="http://schemas.openxmlformats.org/presentationml/2006/main">
-  <p:cSld>
     <p:bg>
       <p:bgPr>
         <a:solidFill>
@@ -12744,7 +12660,7 @@
 </p:sld>
 </file>
 
-<file path=ppt/slides/slide14.xml><?xml version="1.0" encoding="utf-8"?>
+<file path=ppt/slides/slide13.xml><?xml version="1.0" encoding="utf-8"?>
 <p:sld xmlns:a="http://schemas.openxmlformats.org/drawingml/2006/main" xmlns:r="http://schemas.openxmlformats.org/officeDocument/2006/relationships" xmlns:p="http://schemas.openxmlformats.org/presentationml/2006/main">
   <p:cSld>
     <p:bg>
@@ -12771,7 +12687,7 @@
       </p:grpSpPr>
       <p:sp useBgFill="1">
         <p:nvSpPr>
-          <p:cNvPr id="14" name="Rectangle 13">
+          <p:cNvPr id="21" name="Rectangle 20">
             <a:extLst>
               <a:ext uri="{FF2B5EF4-FFF2-40B4-BE49-F238E27FC236}">
                 <a16:creationId xmlns:a16="http://schemas.microsoft.com/office/drawing/2014/main" id="{665DBBEF-238B-476B-96AB-8AAC3224ECEA}"/>
@@ -12873,7 +12789,7 @@
       </p:sp>
       <p:sp>
         <p:nvSpPr>
-          <p:cNvPr id="16" name="sketch line">
+          <p:cNvPr id="23" name="sketch line">
             <a:extLst>
               <a:ext uri="{FF2B5EF4-FFF2-40B4-BE49-F238E27FC236}">
                 <a16:creationId xmlns:a16="http://schemas.microsoft.com/office/drawing/2014/main" id="{3FCFB1DE-0B7E-48CC-BA90-B2AB0889F9D6}"/>
@@ -13146,10 +13062,10 @@
       </p:sp>
       <p:pic>
         <p:nvPicPr>
-          <p:cNvPr id="9" name="Content Placeholder 8" descr="Diagram&#10;&#10;Description automatically generated">
+          <p:cNvPr id="13" name="Content Placeholder 12" descr="Diagram&#10;&#10;Description automatically generated">
             <a:extLst>
               <a:ext uri="{FF2B5EF4-FFF2-40B4-BE49-F238E27FC236}">
-                <a16:creationId xmlns:a16="http://schemas.microsoft.com/office/drawing/2014/main" id="{5923C171-6242-473F-6F98-9E60FFE0B7E6}"/>
+                <a16:creationId xmlns:a16="http://schemas.microsoft.com/office/drawing/2014/main" id="{E9D4D341-FAA0-DF4D-F370-03D7A754DF56}"/>
               </a:ext>
             </a:extLst>
           </p:cNvPr>
@@ -13168,8 +13084,8 @@
         </p:blipFill>
         <p:spPr>
           <a:xfrm>
-            <a:off x="4680695" y="640080"/>
-            <a:ext cx="7161818" cy="5550408"/>
+            <a:off x="4654296" y="1046305"/>
+            <a:ext cx="7214616" cy="4737957"/>
           </a:xfrm>
           <a:prstGeom prst="rect">
             <a:avLst/>
@@ -13189,7 +13105,7 @@
 </p:sld>
 </file>
 
-<file path=ppt/slides/slide15.xml><?xml version="1.0" encoding="utf-8"?>
+<file path=ppt/slides/slide14.xml><?xml version="1.0" encoding="utf-8"?>
 <p:sld xmlns:a="http://schemas.openxmlformats.org/drawingml/2006/main" xmlns:r="http://schemas.openxmlformats.org/officeDocument/2006/relationships" xmlns:p="http://schemas.openxmlformats.org/presentationml/2006/main">
   <p:cSld>
     <p:bg>
@@ -13634,7 +13550,7 @@
 </p:sld>
 </file>
 
-<file path=ppt/slides/slide16.xml><?xml version="1.0" encoding="utf-8"?>
+<file path=ppt/slides/slide15.xml><?xml version="1.0" encoding="utf-8"?>
 <p:sld xmlns:a="http://schemas.openxmlformats.org/drawingml/2006/main" xmlns:r="http://schemas.openxmlformats.org/officeDocument/2006/relationships" xmlns:p="http://schemas.openxmlformats.org/presentationml/2006/main">
   <p:cSld>
     <p:bg>
@@ -14079,7 +13995,7 @@
 </p:sld>
 </file>
 
-<file path=ppt/slides/slide17.xml><?xml version="1.0" encoding="utf-8"?>
+<file path=ppt/slides/slide16.xml><?xml version="1.0" encoding="utf-8"?>
 <p:sld xmlns:a="http://schemas.openxmlformats.org/drawingml/2006/main" xmlns:r="http://schemas.openxmlformats.org/officeDocument/2006/relationships" xmlns:p="http://schemas.openxmlformats.org/presentationml/2006/main">
   <p:cSld>
     <p:bg>
@@ -14503,8 +14419,8 @@
         </p:blipFill>
         <p:spPr>
           <a:xfrm>
-            <a:off x="4654296" y="1476357"/>
-            <a:ext cx="7214616" cy="3877854"/>
+            <a:off x="3351962" y="1476357"/>
+            <a:ext cx="8516950" cy="4577858"/>
           </a:xfrm>
           <a:prstGeom prst="rect">
             <a:avLst/>
@@ -14524,7 +14440,7 @@
 </p:sld>
 </file>
 
-<file path=ppt/slides/slide18.xml><?xml version="1.0" encoding="utf-8"?>
+<file path=ppt/slides/slide17.xml><?xml version="1.0" encoding="utf-8"?>
 <p:sld xmlns:a="http://schemas.openxmlformats.org/drawingml/2006/main" xmlns:r="http://schemas.openxmlformats.org/officeDocument/2006/relationships" xmlns:p="http://schemas.openxmlformats.org/presentationml/2006/main">
   <p:cSld>
     <p:bg>
@@ -14638,7 +14554,7 @@
           <a:lstStyle/>
           <a:p>
             <a:r>
-              <a:rPr lang="en-US" sz="5400"/>
+              <a:rPr lang="en-US" sz="5400" dirty="0"/>
               <a:t>Next Phase</a:t>
             </a:r>
           </a:p>
@@ -15016,24 +14932,39 @@
           <a:lstStyle/>
           <a:p>
             <a:r>
-              <a:rPr lang="en-US" sz="2200"/>
+              <a:rPr lang="en-US" sz="2200" dirty="0"/>
               <a:t>Search results listing with titles and summary</a:t>
             </a:r>
           </a:p>
           <a:p>
             <a:r>
-              <a:rPr lang="en-US" sz="2200"/>
+              <a:rPr lang="en-US" sz="2200" dirty="0"/>
               <a:t>Ranking algorithm</a:t>
             </a:r>
           </a:p>
           <a:p>
             <a:r>
-              <a:rPr lang="en-US" sz="2200"/>
-              <a:t>Deployment</a:t>
+              <a:rPr lang="en-US" sz="2200" dirty="0"/>
+              <a:t>Filtering</a:t>
             </a:r>
           </a:p>
           <a:p>
-            <a:endParaRPr lang="en-US" sz="2200"/>
+            <a:r>
+              <a:rPr lang="en-US" sz="2200" dirty="0"/>
+              <a:t>Pagination</a:t>
+            </a:r>
+          </a:p>
+          <a:p>
+            <a:r>
+              <a:rPr lang="en-US" sz="2200" dirty="0"/>
+              <a:t>Testing</a:t>
+            </a:r>
+          </a:p>
+          <a:p>
+            <a:r>
+              <a:rPr lang="en-US" sz="2200" dirty="0"/>
+              <a:t>Auto DevOps</a:t>
+            </a:r>
           </a:p>
         </p:txBody>
       </p:sp>
@@ -15050,7 +14981,7 @@
 </p:sld>
 </file>
 
-<file path=ppt/slides/slide19.xml><?xml version="1.0" encoding="utf-8"?>
+<file path=ppt/slides/slide18.xml><?xml version="1.0" encoding="utf-8"?>
 <p:sld xmlns:a="http://schemas.openxmlformats.org/drawingml/2006/main" xmlns:r="http://schemas.openxmlformats.org/officeDocument/2006/relationships" xmlns:p="http://schemas.openxmlformats.org/presentationml/2006/main">
   <p:cSld>
     <p:bg>
@@ -16585,7 +16516,7 @@
           <a:lstStyle/>
           <a:p>
             <a:r>
-              <a:rPr lang="en-US" sz="5400" kern="1200">
+              <a:rPr lang="en-US" sz="5400" kern="1200" dirty="0">
                 <a:solidFill>
                   <a:schemeClr val="tx1"/>
                 </a:solidFill>
@@ -16593,7 +16524,7 @@
                 <a:ea typeface="+mj-ea"/>
                 <a:cs typeface="+mj-cs"/>
               </a:rPr>
-              <a:t>Process Flow</a:t>
+              <a:t>Big Picture</a:t>
             </a:r>
           </a:p>
         </p:txBody>

</xml_diff>